<commit_message>
Updated docs and deleted sprints that are no longer used.
</commit_message>
<xml_diff>
--- a/BusinessLogic/Docs/EdaWorkshop_Intro.pptx
+++ b/BusinessLogic/Docs/EdaWorkshop_Intro.pptx
@@ -256,7 +256,7 @@
           <a:p>
             <a:fld id="{0B5D536D-AE8C-4EAC-8CEB-B18A64A144B4}" type="datetimeFigureOut">
               <a:rPr lang="en-US" smtClean="0"/>
-              <a:t>9/25/2021</a:t>
+              <a:t>10/4/2021</a:t>
             </a:fld>
             <a:endParaRPr lang="en-US"/>
           </a:p>
@@ -426,7 +426,7 @@
           <a:p>
             <a:fld id="{0B5D536D-AE8C-4EAC-8CEB-B18A64A144B4}" type="datetimeFigureOut">
               <a:rPr lang="en-US" smtClean="0"/>
-              <a:t>9/25/2021</a:t>
+              <a:t>10/4/2021</a:t>
             </a:fld>
             <a:endParaRPr lang="en-US"/>
           </a:p>
@@ -606,7 +606,7 @@
           <a:p>
             <a:fld id="{0B5D536D-AE8C-4EAC-8CEB-B18A64A144B4}" type="datetimeFigureOut">
               <a:rPr lang="en-US" smtClean="0"/>
-              <a:t>9/25/2021</a:t>
+              <a:t>10/4/2021</a:t>
             </a:fld>
             <a:endParaRPr lang="en-US"/>
           </a:p>
@@ -776,7 +776,7 @@
           <a:p>
             <a:fld id="{0B5D536D-AE8C-4EAC-8CEB-B18A64A144B4}" type="datetimeFigureOut">
               <a:rPr lang="en-US" smtClean="0"/>
-              <a:t>9/25/2021</a:t>
+              <a:t>10/4/2021</a:t>
             </a:fld>
             <a:endParaRPr lang="en-US"/>
           </a:p>
@@ -1022,7 +1022,7 @@
           <a:p>
             <a:fld id="{0B5D536D-AE8C-4EAC-8CEB-B18A64A144B4}" type="datetimeFigureOut">
               <a:rPr lang="en-US" smtClean="0"/>
-              <a:t>9/25/2021</a:t>
+              <a:t>10/4/2021</a:t>
             </a:fld>
             <a:endParaRPr lang="en-US"/>
           </a:p>
@@ -1254,7 +1254,7 @@
           <a:p>
             <a:fld id="{0B5D536D-AE8C-4EAC-8CEB-B18A64A144B4}" type="datetimeFigureOut">
               <a:rPr lang="en-US" smtClean="0"/>
-              <a:t>9/25/2021</a:t>
+              <a:t>10/4/2021</a:t>
             </a:fld>
             <a:endParaRPr lang="en-US"/>
           </a:p>
@@ -1621,7 +1621,7 @@
           <a:p>
             <a:fld id="{0B5D536D-AE8C-4EAC-8CEB-B18A64A144B4}" type="datetimeFigureOut">
               <a:rPr lang="en-US" smtClean="0"/>
-              <a:t>9/25/2021</a:t>
+              <a:t>10/4/2021</a:t>
             </a:fld>
             <a:endParaRPr lang="en-US"/>
           </a:p>
@@ -1739,7 +1739,7 @@
           <a:p>
             <a:fld id="{0B5D536D-AE8C-4EAC-8CEB-B18A64A144B4}" type="datetimeFigureOut">
               <a:rPr lang="en-US" smtClean="0"/>
-              <a:t>9/25/2021</a:t>
+              <a:t>10/4/2021</a:t>
             </a:fld>
             <a:endParaRPr lang="en-US"/>
           </a:p>
@@ -1834,7 +1834,7 @@
           <a:p>
             <a:fld id="{0B5D536D-AE8C-4EAC-8CEB-B18A64A144B4}" type="datetimeFigureOut">
               <a:rPr lang="en-US" smtClean="0"/>
-              <a:t>9/25/2021</a:t>
+              <a:t>10/4/2021</a:t>
             </a:fld>
             <a:endParaRPr lang="en-US"/>
           </a:p>
@@ -2111,7 +2111,7 @@
           <a:p>
             <a:fld id="{0B5D536D-AE8C-4EAC-8CEB-B18A64A144B4}" type="datetimeFigureOut">
               <a:rPr lang="en-US" smtClean="0"/>
-              <a:t>9/25/2021</a:t>
+              <a:t>10/4/2021</a:t>
             </a:fld>
             <a:endParaRPr lang="en-US"/>
           </a:p>
@@ -2364,7 +2364,7 @@
           <a:p>
             <a:fld id="{0B5D536D-AE8C-4EAC-8CEB-B18A64A144B4}" type="datetimeFigureOut">
               <a:rPr lang="en-US" smtClean="0"/>
-              <a:t>9/25/2021</a:t>
+              <a:t>10/4/2021</a:t>
             </a:fld>
             <a:endParaRPr lang="en-US"/>
           </a:p>
@@ -2577,7 +2577,7 @@
           <a:p>
             <a:fld id="{0B5D536D-AE8C-4EAC-8CEB-B18A64A144B4}" type="datetimeFigureOut">
               <a:rPr lang="en-US" smtClean="0"/>
-              <a:t>9/25/2021</a:t>
+              <a:t>10/4/2021</a:t>
             </a:fld>
             <a:endParaRPr lang="en-US"/>
           </a:p>
@@ -6079,8 +6079,24 @@
           <a:p>
             <a:pPr lvl="1"/>
             <a:r>
+              <a:rPr lang="en-US" sz="3000" smtClean="0"/>
+              <a:t>Could </a:t>
+            </a:r>
+            <a:r>
               <a:rPr lang="en-US" sz="3000" dirty="0" smtClean="0"/>
-              <a:t>!!!Could be around $5 in charges to complete workshop, but there’s a $200 when you first signup and you may be eligible for an ongoing monthly Visual Studio credit.</a:t>
+              <a:t>be around $5 in charges to complete workshop, but there’s a $</a:t>
+            </a:r>
+            <a:r>
+              <a:rPr lang="en-US" sz="3000" smtClean="0"/>
+              <a:t>200 </a:t>
+            </a:r>
+            <a:r>
+              <a:rPr lang="en-US" sz="3000" smtClean="0"/>
+              <a:t>credit when </a:t>
+            </a:r>
+            <a:r>
+              <a:rPr lang="en-US" sz="3000" dirty="0" smtClean="0"/>
+              <a:t>you first signup and you may be eligible for an ongoing monthly Visual Studio credit.</a:t>
             </a:r>
           </a:p>
           <a:p>
@@ -6128,18 +6144,18 @@
           <a:p>
             <a:pPr lvl="1"/>
             <a:r>
-              <a:rPr lang="en-US" sz="2800">
+              <a:rPr lang="en-US" sz="2800" dirty="0">
                 <a:hlinkClick r:id="rId4"/>
               </a:rPr>
               <a:t>https://developer.ibm.com/articles/advantages-of-an-event-driven-architecture</a:t>
             </a:r>
             <a:r>
-              <a:rPr lang="en-US" sz="2800" smtClean="0">
+              <a:rPr lang="en-US" sz="2800" dirty="0" smtClean="0">
                 <a:hlinkClick r:id="rId4"/>
               </a:rPr>
               <a:t>/</a:t>
             </a:r>
-            <a:endParaRPr lang="en-US" sz="2800" smtClean="0"/>
+            <a:endParaRPr lang="en-US" sz="2800" dirty="0" smtClean="0"/>
           </a:p>
         </p:txBody>
       </p:sp>

</xml_diff>